<commit_message>
add: implement error handling and asynchronous examples in Dart, including futures and streams
</commit_message>
<xml_diff>
--- a/08_POO/00_RESOURCES/CLASE/POO.pptx
+++ b/08_POO/00_RESOURCES/CLASE/POO.pptx
@@ -1067,6 +1067,51 @@
             <a:rPr lang="es-EC" dirty="0"/>
             <a:t>Qué es una clase?</a:t>
           </a:r>
+        </a:p>
+        <a:p>
+          <a:pPr>
+            <a:defRPr cap="all"/>
+          </a:pPr>
+          <a:r>
+            <a:rPr lang="es-EC" dirty="0"/>
+            <a:t>Plantilla</a:t>
+          </a:r>
+        </a:p>
+        <a:p>
+          <a:pPr>
+            <a:defRPr cap="all"/>
+          </a:pPr>
+          <a:r>
+            <a:rPr lang="es-EC" dirty="0"/>
+            <a:t>Atributos</a:t>
+          </a:r>
+        </a:p>
+        <a:p>
+          <a:pPr>
+            <a:defRPr cap="all"/>
+          </a:pPr>
+          <a:r>
+            <a:rPr lang="es-EC" dirty="0"/>
+            <a:t>Constructor</a:t>
+          </a:r>
+        </a:p>
+        <a:p>
+          <a:pPr>
+            <a:defRPr cap="all"/>
+          </a:pPr>
+          <a:r>
+            <a:rPr lang="es-EC" dirty="0"/>
+            <a:t>Métodos</a:t>
+          </a:r>
+        </a:p>
+        <a:p>
+          <a:pPr>
+            <a:defRPr cap="all"/>
+          </a:pPr>
+          <a:r>
+            <a:rPr lang="es-EC" dirty="0"/>
+            <a:t>Get SET</a:t>
+          </a:r>
           <a:endParaRPr lang="en-US" dirty="0"/>
         </a:p>
       </dgm:t>
@@ -1104,10 +1149,28 @@
             <a:defRPr cap="all"/>
           </a:pPr>
           <a:r>
-            <a:rPr lang="es-EC"/>
+            <a:rPr lang="es-EC" dirty="0"/>
             <a:t>Qué es un objeto?</a:t>
           </a:r>
-          <a:endParaRPr lang="en-US"/>
+        </a:p>
+        <a:p>
+          <a:pPr>
+            <a:defRPr cap="all"/>
+          </a:pPr>
+          <a:r>
+            <a:rPr lang="es-EC" dirty="0"/>
+            <a:t>Instancia de la clase</a:t>
+          </a:r>
+        </a:p>
+        <a:p>
+          <a:pPr>
+            <a:defRPr cap="all"/>
+          </a:pPr>
+          <a:r>
+            <a:rPr lang="es-EC" dirty="0"/>
+            <a:t>Variable que se forma a partir de la plantilla </a:t>
+          </a:r>
+          <a:endParaRPr lang="en-US" dirty="0"/>
         </a:p>
       </dgm:t>
     </dgm:pt>
@@ -1144,10 +1207,27 @@
             <a:defRPr cap="all"/>
           </a:pPr>
           <a:r>
-            <a:rPr lang="es-EC"/>
+            <a:rPr lang="es-EC" dirty="0"/>
             <a:t>Que es un método?</a:t>
           </a:r>
-          <a:endParaRPr lang="en-US"/>
+        </a:p>
+        <a:p>
+          <a:pPr>
+            <a:defRPr cap="all"/>
+          </a:pPr>
+          <a:r>
+            <a:rPr lang="es-EC" dirty="0"/>
+            <a:t>Función que se ejecuta en las clases</a:t>
+          </a:r>
+        </a:p>
+        <a:p>
+          <a:pPr>
+            <a:defRPr cap="all"/>
+          </a:pPr>
+          <a:r>
+            <a:rPr lang="es-EC" dirty="0"/>
+            <a:t>Puede retornar valores </a:t>
+          </a:r>
         </a:p>
       </dgm:t>
     </dgm:pt>
@@ -1389,7 +1469,7 @@
       </dsp:nvSpPr>
       <dsp:spPr>
         <a:xfrm>
-          <a:off x="639687" y="376613"/>
+          <a:off x="639687" y="151613"/>
           <a:ext cx="1715625" cy="1715625"/>
         </a:xfrm>
         <a:prstGeom prst="ellipse">
@@ -1428,7 +1508,7 @@
       </dsp:nvSpPr>
       <dsp:spPr>
         <a:xfrm>
-          <a:off x="1005312" y="742238"/>
+          <a:off x="1005312" y="517238"/>
           <a:ext cx="984375" cy="984375"/>
         </a:xfrm>
         <a:prstGeom prst="rect">
@@ -1477,8 +1557,8 @@
       </dsp:nvSpPr>
       <dsp:spPr>
         <a:xfrm>
-          <a:off x="91250" y="2626613"/>
-          <a:ext cx="2812500" cy="720000"/>
+          <a:off x="91250" y="2401613"/>
+          <a:ext cx="2812500" cy="1170000"/>
         </a:xfrm>
         <a:prstGeom prst="rect">
           <a:avLst/>
@@ -1507,7 +1587,7 @@
         </a:bodyPr>
         <a:lstStyle/>
         <a:p>
-          <a:pPr marL="0" lvl="0" indent="0" algn="ctr" defTabSz="1200150">
+          <a:pPr marL="0" lvl="0" indent="0" algn="ctr" defTabSz="488950">
             <a:lnSpc>
               <a:spcPct val="90000"/>
             </a:lnSpc>
@@ -1521,15 +1601,110 @@
             <a:defRPr cap="all"/>
           </a:pPr>
           <a:r>
-            <a:rPr lang="es-EC" sz="2700" kern="1200" dirty="0"/>
+            <a:rPr lang="es-EC" sz="1100" kern="1200" dirty="0"/>
             <a:t>Qué es una clase?</a:t>
           </a:r>
-          <a:endParaRPr lang="en-US" sz="2700" kern="1200" dirty="0"/>
+        </a:p>
+        <a:p>
+          <a:pPr marL="0" lvl="0" indent="0" algn="ctr" defTabSz="488950">
+            <a:lnSpc>
+              <a:spcPct val="90000"/>
+            </a:lnSpc>
+            <a:spcBef>
+              <a:spcPct val="0"/>
+            </a:spcBef>
+            <a:spcAft>
+              <a:spcPct val="35000"/>
+            </a:spcAft>
+            <a:buNone/>
+            <a:defRPr cap="all"/>
+          </a:pPr>
+          <a:r>
+            <a:rPr lang="es-EC" sz="1100" kern="1200" dirty="0"/>
+            <a:t>Plantilla</a:t>
+          </a:r>
+        </a:p>
+        <a:p>
+          <a:pPr marL="0" lvl="0" indent="0" algn="ctr" defTabSz="488950">
+            <a:lnSpc>
+              <a:spcPct val="90000"/>
+            </a:lnSpc>
+            <a:spcBef>
+              <a:spcPct val="0"/>
+            </a:spcBef>
+            <a:spcAft>
+              <a:spcPct val="35000"/>
+            </a:spcAft>
+            <a:buNone/>
+            <a:defRPr cap="all"/>
+          </a:pPr>
+          <a:r>
+            <a:rPr lang="es-EC" sz="1100" kern="1200" dirty="0"/>
+            <a:t>Atributos</a:t>
+          </a:r>
+        </a:p>
+        <a:p>
+          <a:pPr marL="0" lvl="0" indent="0" algn="ctr" defTabSz="488950">
+            <a:lnSpc>
+              <a:spcPct val="90000"/>
+            </a:lnSpc>
+            <a:spcBef>
+              <a:spcPct val="0"/>
+            </a:spcBef>
+            <a:spcAft>
+              <a:spcPct val="35000"/>
+            </a:spcAft>
+            <a:buNone/>
+            <a:defRPr cap="all"/>
+          </a:pPr>
+          <a:r>
+            <a:rPr lang="es-EC" sz="1100" kern="1200" dirty="0"/>
+            <a:t>Constructor</a:t>
+          </a:r>
+        </a:p>
+        <a:p>
+          <a:pPr marL="0" lvl="0" indent="0" algn="ctr" defTabSz="488950">
+            <a:lnSpc>
+              <a:spcPct val="90000"/>
+            </a:lnSpc>
+            <a:spcBef>
+              <a:spcPct val="0"/>
+            </a:spcBef>
+            <a:spcAft>
+              <a:spcPct val="35000"/>
+            </a:spcAft>
+            <a:buNone/>
+            <a:defRPr cap="all"/>
+          </a:pPr>
+          <a:r>
+            <a:rPr lang="es-EC" sz="1100" kern="1200" dirty="0"/>
+            <a:t>Métodos</a:t>
+          </a:r>
+        </a:p>
+        <a:p>
+          <a:pPr marL="0" lvl="0" indent="0" algn="ctr" defTabSz="488950">
+            <a:lnSpc>
+              <a:spcPct val="90000"/>
+            </a:lnSpc>
+            <a:spcBef>
+              <a:spcPct val="0"/>
+            </a:spcBef>
+            <a:spcAft>
+              <a:spcPct val="35000"/>
+            </a:spcAft>
+            <a:buNone/>
+            <a:defRPr cap="all"/>
+          </a:pPr>
+          <a:r>
+            <a:rPr lang="es-EC" sz="1100" kern="1200" dirty="0"/>
+            <a:t>Get SET</a:t>
+          </a:r>
+          <a:endParaRPr lang="en-US" sz="1100" kern="1200" dirty="0"/>
         </a:p>
       </dsp:txBody>
       <dsp:txXfrm>
-        <a:off x="91250" y="2626613"/>
-        <a:ext cx="2812500" cy="720000"/>
+        <a:off x="91250" y="2401613"/>
+        <a:ext cx="2812500" cy="1170000"/>
       </dsp:txXfrm>
     </dsp:sp>
     <dsp:sp modelId="{8AD3B4DC-6EF9-4BDF-B78A-7C0737CE7933}">
@@ -1539,7 +1714,7 @@
       </dsp:nvSpPr>
       <dsp:spPr>
         <a:xfrm>
-          <a:off x="3944375" y="376613"/>
+          <a:off x="3944375" y="151613"/>
           <a:ext cx="1715625" cy="1715625"/>
         </a:xfrm>
         <a:prstGeom prst="ellipse">
@@ -1578,7 +1753,7 @@
       </dsp:nvSpPr>
       <dsp:spPr>
         <a:xfrm>
-          <a:off x="4310000" y="742238"/>
+          <a:off x="4310000" y="517238"/>
           <a:ext cx="984375" cy="984375"/>
         </a:xfrm>
         <a:prstGeom prst="rect">
@@ -1627,8 +1802,8 @@
       </dsp:nvSpPr>
       <dsp:spPr>
         <a:xfrm>
-          <a:off x="3395937" y="2626613"/>
-          <a:ext cx="2812500" cy="720000"/>
+          <a:off x="3395937" y="2401613"/>
+          <a:ext cx="2812500" cy="1170000"/>
         </a:xfrm>
         <a:prstGeom prst="rect">
           <a:avLst/>
@@ -1657,7 +1832,7 @@
         </a:bodyPr>
         <a:lstStyle/>
         <a:p>
-          <a:pPr marL="0" lvl="0" indent="0" algn="ctr" defTabSz="1200150">
+          <a:pPr marL="0" lvl="0" indent="0" algn="ctr" defTabSz="488950">
             <a:lnSpc>
               <a:spcPct val="90000"/>
             </a:lnSpc>
@@ -1671,15 +1846,53 @@
             <a:defRPr cap="all"/>
           </a:pPr>
           <a:r>
-            <a:rPr lang="es-EC" sz="2700" kern="1200"/>
+            <a:rPr lang="es-EC" sz="1100" kern="1200" dirty="0"/>
             <a:t>Qué es un objeto?</a:t>
           </a:r>
-          <a:endParaRPr lang="en-US" sz="2700" kern="1200"/>
+        </a:p>
+        <a:p>
+          <a:pPr marL="0" lvl="0" indent="0" algn="ctr" defTabSz="488950">
+            <a:lnSpc>
+              <a:spcPct val="90000"/>
+            </a:lnSpc>
+            <a:spcBef>
+              <a:spcPct val="0"/>
+            </a:spcBef>
+            <a:spcAft>
+              <a:spcPct val="35000"/>
+            </a:spcAft>
+            <a:buNone/>
+            <a:defRPr cap="all"/>
+          </a:pPr>
+          <a:r>
+            <a:rPr lang="es-EC" sz="1100" kern="1200" dirty="0"/>
+            <a:t>Instancia de la clase</a:t>
+          </a:r>
+        </a:p>
+        <a:p>
+          <a:pPr marL="0" lvl="0" indent="0" algn="ctr" defTabSz="488950">
+            <a:lnSpc>
+              <a:spcPct val="90000"/>
+            </a:lnSpc>
+            <a:spcBef>
+              <a:spcPct val="0"/>
+            </a:spcBef>
+            <a:spcAft>
+              <a:spcPct val="35000"/>
+            </a:spcAft>
+            <a:buNone/>
+            <a:defRPr cap="all"/>
+          </a:pPr>
+          <a:r>
+            <a:rPr lang="es-EC" sz="1100" kern="1200" dirty="0"/>
+            <a:t>Variable que se forma a partir de la plantilla </a:t>
+          </a:r>
+          <a:endParaRPr lang="en-US" sz="1100" kern="1200" dirty="0"/>
         </a:p>
       </dsp:txBody>
       <dsp:txXfrm>
-        <a:off x="3395937" y="2626613"/>
-        <a:ext cx="2812500" cy="720000"/>
+        <a:off x="3395937" y="2401613"/>
+        <a:ext cx="2812500" cy="1170000"/>
       </dsp:txXfrm>
     </dsp:sp>
     <dsp:sp modelId="{A387B66F-7945-4600-BD12-442A780BF9CB}">
@@ -1689,7 +1902,7 @@
       </dsp:nvSpPr>
       <dsp:spPr>
         <a:xfrm>
-          <a:off x="7249062" y="376613"/>
+          <a:off x="7249062" y="151613"/>
           <a:ext cx="1715625" cy="1715625"/>
         </a:xfrm>
         <a:prstGeom prst="ellipse">
@@ -1728,7 +1941,7 @@
       </dsp:nvSpPr>
       <dsp:spPr>
         <a:xfrm>
-          <a:off x="7614687" y="742238"/>
+          <a:off x="7614687" y="517238"/>
           <a:ext cx="984375" cy="984375"/>
         </a:xfrm>
         <a:prstGeom prst="rect">
@@ -1777,8 +1990,8 @@
       </dsp:nvSpPr>
       <dsp:spPr>
         <a:xfrm>
-          <a:off x="6700625" y="2626613"/>
-          <a:ext cx="2812500" cy="720000"/>
+          <a:off x="6700625" y="2401613"/>
+          <a:ext cx="2812500" cy="1170000"/>
         </a:xfrm>
         <a:prstGeom prst="rect">
           <a:avLst/>
@@ -1807,7 +2020,7 @@
         </a:bodyPr>
         <a:lstStyle/>
         <a:p>
-          <a:pPr marL="0" lvl="0" indent="0" algn="ctr" defTabSz="1200150">
+          <a:pPr marL="0" lvl="0" indent="0" algn="ctr" defTabSz="488950">
             <a:lnSpc>
               <a:spcPct val="90000"/>
             </a:lnSpc>
@@ -1821,15 +2034,52 @@
             <a:defRPr cap="all"/>
           </a:pPr>
           <a:r>
-            <a:rPr lang="es-EC" sz="2700" kern="1200"/>
+            <a:rPr lang="es-EC" sz="1100" kern="1200" dirty="0"/>
             <a:t>Que es un método?</a:t>
           </a:r>
-          <a:endParaRPr lang="en-US" sz="2700" kern="1200"/>
+        </a:p>
+        <a:p>
+          <a:pPr marL="0" lvl="0" indent="0" algn="ctr" defTabSz="488950">
+            <a:lnSpc>
+              <a:spcPct val="90000"/>
+            </a:lnSpc>
+            <a:spcBef>
+              <a:spcPct val="0"/>
+            </a:spcBef>
+            <a:spcAft>
+              <a:spcPct val="35000"/>
+            </a:spcAft>
+            <a:buNone/>
+            <a:defRPr cap="all"/>
+          </a:pPr>
+          <a:r>
+            <a:rPr lang="es-EC" sz="1100" kern="1200" dirty="0"/>
+            <a:t>Función que se ejecuta en las clases</a:t>
+          </a:r>
+        </a:p>
+        <a:p>
+          <a:pPr marL="0" lvl="0" indent="0" algn="ctr" defTabSz="488950">
+            <a:lnSpc>
+              <a:spcPct val="90000"/>
+            </a:lnSpc>
+            <a:spcBef>
+              <a:spcPct val="0"/>
+            </a:spcBef>
+            <a:spcAft>
+              <a:spcPct val="35000"/>
+            </a:spcAft>
+            <a:buNone/>
+            <a:defRPr cap="all"/>
+          </a:pPr>
+          <a:r>
+            <a:rPr lang="es-EC" sz="1100" kern="1200" dirty="0"/>
+            <a:t>Puede retornar valores </a:t>
+          </a:r>
         </a:p>
       </dsp:txBody>
       <dsp:txXfrm>
-        <a:off x="6700625" y="2626613"/>
-        <a:ext cx="2812500" cy="720000"/>
+        <a:off x="6700625" y="2401613"/>
+        <a:ext cx="2812500" cy="1170000"/>
       </dsp:txXfrm>
     </dsp:sp>
   </dsp:spTree>
@@ -3224,7 +3474,7 @@
           <a:p>
             <a:fld id="{48A87A34-81AB-432B-8DAE-1953F412C126}" type="datetimeFigureOut">
               <a:rPr lang="en-US" dirty="0"/>
-              <a:t>11/18/24</a:t>
+              <a:t>11/19/24</a:t>
             </a:fld>
             <a:endParaRPr lang="en-US" dirty="0"/>
           </a:p>
@@ -3430,7 +3680,7 @@
           <a:p>
             <a:fld id="{48A87A34-81AB-432B-8DAE-1953F412C126}" type="datetimeFigureOut">
               <a:rPr lang="en-US" dirty="0"/>
-              <a:t>11/18/24</a:t>
+              <a:t>11/19/24</a:t>
             </a:fld>
             <a:endParaRPr lang="en-US" dirty="0"/>
           </a:p>
@@ -3640,7 +3890,7 @@
           <a:p>
             <a:fld id="{48A87A34-81AB-432B-8DAE-1953F412C126}" type="datetimeFigureOut">
               <a:rPr lang="en-US" dirty="0"/>
-              <a:t>11/18/24</a:t>
+              <a:t>11/19/24</a:t>
             </a:fld>
             <a:endParaRPr lang="en-US" dirty="0"/>
           </a:p>
@@ -3836,7 +4086,7 @@
           <a:p>
             <a:fld id="{48A87A34-81AB-432B-8DAE-1953F412C126}" type="datetimeFigureOut">
               <a:rPr lang="en-US" dirty="0"/>
-              <a:t>11/18/24</a:t>
+              <a:t>11/19/24</a:t>
             </a:fld>
             <a:endParaRPr lang="en-US" dirty="0"/>
           </a:p>
@@ -4110,7 +4360,7 @@
           <a:p>
             <a:fld id="{48A87A34-81AB-432B-8DAE-1953F412C126}" type="datetimeFigureOut">
               <a:rPr lang="en-US" dirty="0"/>
-              <a:t>11/18/24</a:t>
+              <a:t>11/19/24</a:t>
             </a:fld>
             <a:endParaRPr lang="en-US" dirty="0"/>
           </a:p>
@@ -4373,7 +4623,7 @@
           <a:p>
             <a:fld id="{48A87A34-81AB-432B-8DAE-1953F412C126}" type="datetimeFigureOut">
               <a:rPr lang="en-US" dirty="0"/>
-              <a:t>11/18/24</a:t>
+              <a:t>11/19/24</a:t>
             </a:fld>
             <a:endParaRPr lang="en-US" dirty="0"/>
           </a:p>
@@ -4784,7 +5034,7 @@
           <a:p>
             <a:fld id="{48A87A34-81AB-432B-8DAE-1953F412C126}" type="datetimeFigureOut">
               <a:rPr lang="en-US" dirty="0"/>
-              <a:t>11/18/24</a:t>
+              <a:t>11/19/24</a:t>
             </a:fld>
             <a:endParaRPr lang="en-US" dirty="0"/>
           </a:p>
@@ -4928,7 +5178,7 @@
           <a:p>
             <a:fld id="{48A87A34-81AB-432B-8DAE-1953F412C126}" type="datetimeFigureOut">
               <a:rPr lang="en-US" dirty="0"/>
-              <a:t>11/18/24</a:t>
+              <a:t>11/19/24</a:t>
             </a:fld>
             <a:endParaRPr lang="en-US" dirty="0"/>
           </a:p>
@@ -5049,7 +5299,7 @@
           <a:p>
             <a:fld id="{48A87A34-81AB-432B-8DAE-1953F412C126}" type="datetimeFigureOut">
               <a:rPr lang="en-US" dirty="0"/>
-              <a:t>11/18/24</a:t>
+              <a:t>11/19/24</a:t>
             </a:fld>
             <a:endParaRPr lang="en-US" dirty="0"/>
           </a:p>
@@ -5295,7 +5545,7 @@
           <a:p>
             <a:fld id="{48A87A34-81AB-432B-8DAE-1953F412C126}" type="datetimeFigureOut">
               <a:rPr lang="en-US" dirty="0"/>
-              <a:t>11/18/24</a:t>
+              <a:t>11/19/24</a:t>
             </a:fld>
             <a:endParaRPr lang="en-US" dirty="0"/>
           </a:p>
@@ -5736,7 +5986,7 @@
             <a:fld id="{48A87A34-81AB-432B-8DAE-1953F412C126}" type="datetimeFigureOut">
               <a:rPr lang="en-US" dirty="0"/>
               <a:pPr/>
-              <a:t>11/18/24</a:t>
+              <a:t>11/19/24</a:t>
             </a:fld>
             <a:endParaRPr lang="en-US" dirty="0"/>
           </a:p>
@@ -6059,7 +6309,7 @@
             <a:fld id="{48A87A34-81AB-432B-8DAE-1953F412C126}" type="datetimeFigureOut">
               <a:rPr lang="en-US" dirty="0"/>
               <a:pPr/>
-              <a:t>11/18/24</a:t>
+              <a:t>11/19/24</a:t>
             </a:fld>
             <a:endParaRPr lang="en-US" dirty="0"/>
           </a:p>
@@ -7183,7 +7433,7 @@
             <p:ph idx="1"/>
             <p:extLst>
               <p:ext uri="{D42A27DB-BD31-4B8C-83A1-F6EECF244321}">
-                <p14:modId xmlns:p14="http://schemas.microsoft.com/office/powerpoint/2010/main" val="3931736604"/>
+                <p14:modId xmlns:p14="http://schemas.microsoft.com/office/powerpoint/2010/main" val="194428170"/>
               </p:ext>
             </p:extLst>
           </p:nvPr>
@@ -7399,7 +7649,9 @@
         </p:nvSpPr>
         <p:spPr/>
         <p:txBody>
-          <a:bodyPr/>
+          <a:bodyPr>
+            <a:normAutofit fontScale="85000" lnSpcReduction="20000"/>
+          </a:bodyPr>
           <a:lstStyle/>
           <a:p>
             <a:r>
@@ -7418,6 +7670,81 @@
               <a:rPr lang="es-EC" dirty="0"/>
               <a:t>¿Qué atributos heredan del padre?</a:t>
             </a:r>
+          </a:p>
+          <a:p>
+            <a:endParaRPr lang="es-EC" dirty="0"/>
+          </a:p>
+          <a:p>
+            <a:r>
+              <a:rPr lang="es-EC" dirty="0"/>
+              <a:t>Perro -&gt; </a:t>
+            </a:r>
+            <a:r>
+              <a:rPr lang="es-EC" dirty="0">
+                <a:highlight>
+                  <a:srgbClr val="FFFF00"/>
+                </a:highlight>
+              </a:rPr>
+              <a:t>Nombre, Edad, Color; caminar, comer</a:t>
+            </a:r>
+            <a:r>
+              <a:rPr lang="es-EC" dirty="0"/>
+              <a:t>, ladrar </a:t>
+            </a:r>
+          </a:p>
+          <a:p>
+            <a:r>
+              <a:rPr lang="es-EC" dirty="0"/>
+              <a:t>Gato -&gt; </a:t>
+            </a:r>
+            <a:r>
+              <a:rPr lang="es-EC" dirty="0">
+                <a:highlight>
+                  <a:srgbClr val="FFFF00"/>
+                </a:highlight>
+              </a:rPr>
+              <a:t>Nombre, Edad, Color; caminar, comer, </a:t>
+            </a:r>
+            <a:r>
+              <a:rPr lang="es-EC" dirty="0"/>
+              <a:t>maullar</a:t>
+            </a:r>
+          </a:p>
+          <a:p>
+            <a:r>
+              <a:rPr lang="es-EC" dirty="0"/>
+              <a:t>Hamster -&gt; </a:t>
+            </a:r>
+            <a:r>
+              <a:rPr lang="es-EC" dirty="0">
+                <a:highlight>
+                  <a:srgbClr val="FFFF00"/>
+                </a:highlight>
+              </a:rPr>
+              <a:t>Nombre, Edad, Color; caminar, comer</a:t>
+            </a:r>
+            <a:r>
+              <a:rPr lang="es-EC" dirty="0"/>
+              <a:t>, llorar</a:t>
+            </a:r>
+          </a:p>
+          <a:p>
+            <a:r>
+              <a:rPr lang="es-EC" dirty="0"/>
+              <a:t>Clase Perro; Clase Gato; Clase Hamster </a:t>
+            </a:r>
+          </a:p>
+          <a:p>
+            <a:r>
+              <a:rPr lang="es-EC" dirty="0"/>
+              <a:t>Plantilla de la Plantilla -&gt; Clase Padre -&gt; Clases Hijo (Que va a heredar atributos, métodos … del padre)</a:t>
+            </a:r>
+          </a:p>
+          <a:p>
+            <a:pPr marL="0" indent="0">
+              <a:buNone/>
+            </a:pPr>
+            <a:endParaRPr lang="es-EC" dirty="0"/>
           </a:p>
         </p:txBody>
       </p:sp>
@@ -7443,8 +7770,8 @@
         </p:blipFill>
         <p:spPr>
           <a:xfrm>
-            <a:off x="6102536" y="1989501"/>
-            <a:ext cx="4952318" cy="2878997"/>
+            <a:off x="7195118" y="1989502"/>
+            <a:ext cx="3859736" cy="2243832"/>
           </a:xfrm>
           <a:prstGeom prst="rect">
             <a:avLst/>

</xml_diff>